<commit_message>
DeveloperGuide: Fix register SD
</commit_message>
<xml_diff>
--- a/docs/diagrams/RegisterSequenceDiagram.pptx
+++ b/docs/diagrams/RegisterSequenceDiagram.pptx
@@ -208,7 +208,7 @@
           <a:p>
             <a:fld id="{F5CC4B3F-88C1-4FFA-B1B6-F41C21DC6924}" type="datetimeFigureOut">
               <a:rPr lang="en-US" smtClean="0"/>
-              <a:t>10/18/2018</a:t>
+              <a:t>10/24/2018</a:t>
             </a:fld>
             <a:endParaRPr lang="en-US"/>
           </a:p>
@@ -654,7 +654,7 @@
           <a:p>
             <a:fld id="{78C97017-6FC3-485B-9764-EAC9E56C1D49}" type="datetimeFigureOut">
               <a:rPr lang="en-US" smtClean="0"/>
-              <a:t>10/18/2018</a:t>
+              <a:t>10/24/2018</a:t>
             </a:fld>
             <a:endParaRPr lang="en-US"/>
           </a:p>
@@ -822,7 +822,7 @@
           <a:p>
             <a:fld id="{78C97017-6FC3-485B-9764-EAC9E56C1D49}" type="datetimeFigureOut">
               <a:rPr lang="en-US" smtClean="0"/>
-              <a:t>10/18/2018</a:t>
+              <a:t>10/24/2018</a:t>
             </a:fld>
             <a:endParaRPr lang="en-US"/>
           </a:p>
@@ -1000,7 +1000,7 @@
           <a:p>
             <a:fld id="{78C97017-6FC3-485B-9764-EAC9E56C1D49}" type="datetimeFigureOut">
               <a:rPr lang="en-US" smtClean="0"/>
-              <a:t>10/18/2018</a:t>
+              <a:t>10/24/2018</a:t>
             </a:fld>
             <a:endParaRPr lang="en-US"/>
           </a:p>
@@ -1168,7 +1168,7 @@
           <a:p>
             <a:fld id="{78C97017-6FC3-485B-9764-EAC9E56C1D49}" type="datetimeFigureOut">
               <a:rPr lang="en-US" smtClean="0"/>
-              <a:t>10/18/2018</a:t>
+              <a:t>10/24/2018</a:t>
             </a:fld>
             <a:endParaRPr lang="en-US"/>
           </a:p>
@@ -1413,7 +1413,7 @@
           <a:p>
             <a:fld id="{78C97017-6FC3-485B-9764-EAC9E56C1D49}" type="datetimeFigureOut">
               <a:rPr lang="en-US" smtClean="0"/>
-              <a:t>10/18/2018</a:t>
+              <a:t>10/24/2018</a:t>
             </a:fld>
             <a:endParaRPr lang="en-US"/>
           </a:p>
@@ -1698,7 +1698,7 @@
           <a:p>
             <a:fld id="{78C97017-6FC3-485B-9764-EAC9E56C1D49}" type="datetimeFigureOut">
               <a:rPr lang="en-US" smtClean="0"/>
-              <a:t>10/18/2018</a:t>
+              <a:t>10/24/2018</a:t>
             </a:fld>
             <a:endParaRPr lang="en-US"/>
           </a:p>
@@ -2117,7 +2117,7 @@
           <a:p>
             <a:fld id="{78C97017-6FC3-485B-9764-EAC9E56C1D49}" type="datetimeFigureOut">
               <a:rPr lang="en-US" smtClean="0"/>
-              <a:t>10/18/2018</a:t>
+              <a:t>10/24/2018</a:t>
             </a:fld>
             <a:endParaRPr lang="en-US"/>
           </a:p>
@@ -2234,7 +2234,7 @@
           <a:p>
             <a:fld id="{78C97017-6FC3-485B-9764-EAC9E56C1D49}" type="datetimeFigureOut">
               <a:rPr lang="en-US" smtClean="0"/>
-              <a:t>10/18/2018</a:t>
+              <a:t>10/24/2018</a:t>
             </a:fld>
             <a:endParaRPr lang="en-US"/>
           </a:p>
@@ -2329,7 +2329,7 @@
           <a:p>
             <a:fld id="{78C97017-6FC3-485B-9764-EAC9E56C1D49}" type="datetimeFigureOut">
               <a:rPr lang="en-US" smtClean="0"/>
-              <a:t>10/18/2018</a:t>
+              <a:t>10/24/2018</a:t>
             </a:fld>
             <a:endParaRPr lang="en-US"/>
           </a:p>
@@ -2604,7 +2604,7 @@
           <a:p>
             <a:fld id="{78C97017-6FC3-485B-9764-EAC9E56C1D49}" type="datetimeFigureOut">
               <a:rPr lang="en-US" smtClean="0"/>
-              <a:t>10/18/2018</a:t>
+              <a:t>10/24/2018</a:t>
             </a:fld>
             <a:endParaRPr lang="en-US"/>
           </a:p>
@@ -2856,7 +2856,7 @@
           <a:p>
             <a:fld id="{78C97017-6FC3-485B-9764-EAC9E56C1D49}" type="datetimeFigureOut">
               <a:rPr lang="en-US" smtClean="0"/>
-              <a:t>10/18/2018</a:t>
+              <a:t>10/24/2018</a:t>
             </a:fld>
             <a:endParaRPr lang="en-US"/>
           </a:p>
@@ -3067,7 +3067,7 @@
           <a:p>
             <a:fld id="{78C97017-6FC3-485B-9764-EAC9E56C1D49}" type="datetimeFigureOut">
               <a:rPr lang="en-US" smtClean="0"/>
-              <a:t>10/18/2018</a:t>
+              <a:t>10/24/2018</a:t>
             </a:fld>
             <a:endParaRPr lang="en-US"/>
           </a:p>
@@ -3726,7 +3726,7 @@
         <p:spPr>
           <a:xfrm>
             <a:off x="3437188" y="423022"/>
-            <a:ext cx="1219200" cy="467684"/>
+            <a:ext cx="1211012" cy="467684"/>
           </a:xfrm>
           <a:prstGeom prst="rect">
             <a:avLst/>
@@ -3766,11 +3766,15 @@
                   <a:schemeClr val="bg1"/>
                 </a:solidFill>
               </a:rPr>
-              <a:t>:Address</a:t>
-            </a:r>
-          </a:p>
-          <a:p>
-            <a:pPr algn="ctr"/>
+              <a:t>:Restaurant</a:t>
+            </a:r>
+            <a:br>
+              <a:rPr lang="en-US" sz="1600" dirty="0">
+                <a:solidFill>
+                  <a:schemeClr val="bg1"/>
+                </a:solidFill>
+              </a:rPr>
+            </a:br>
             <a:r>
               <a:rPr lang="en-US" sz="1600" dirty="0" err="1">
                 <a:solidFill>
@@ -4030,23 +4034,7 @@
                   <a:srgbClr val="0070C0"/>
                 </a:solidFill>
               </a:rPr>
-              <a:t>execute(“login id/</a:t>
-            </a:r>
-            <a:r>
-              <a:rPr lang="en-US" sz="1400" dirty="0" err="1">
-                <a:solidFill>
-                  <a:srgbClr val="0070C0"/>
-                </a:solidFill>
-              </a:rPr>
-              <a:t>azhikai</a:t>
-            </a:r>
-            <a:r>
-              <a:rPr lang="en-US" sz="1400" dirty="0">
-                <a:solidFill>
-                  <a:srgbClr val="0070C0"/>
-                </a:solidFill>
-              </a:rPr>
-              <a:t> pw/1122qq”)</a:t>
+              <a:t>execute(“register id/azhikai pw/1122qq”)</a:t>
             </a:r>
           </a:p>
         </p:txBody>
@@ -4394,15 +4382,7 @@
             </a:r>
             <a:r>
               <a:rPr lang="en-US" dirty="0"/>
-              <a:t>(“login id/</a:t>
-            </a:r>
-            <a:r>
-              <a:rPr lang="en-US" dirty="0" err="1"/>
-              <a:t>azhikai</a:t>
-            </a:r>
-            <a:r>
-              <a:rPr lang="en-US" dirty="0"/>
-              <a:t> pw/1122qq”)</a:t>
+              <a:t>(“register id/azhikai pw/1122qq”)</a:t>
             </a:r>
           </a:p>
         </p:txBody>
@@ -4544,7 +4524,7 @@
                   <a:schemeClr val="bg1"/>
                 </a:solidFill>
               </a:rPr>
-              <a:t>AddressBook</a:t>
+              <a:t>RestaurantBook</a:t>
             </a:r>
             <a:endParaRPr lang="en-SG" sz="1600" dirty="0">
               <a:solidFill>
@@ -4635,9 +4615,10 @@
           </a:lstStyle>
           <a:p>
             <a:r>
-              <a:rPr lang="en-US" dirty="0"/>
-              <a:t>u</a:t>
-            </a:r>
+              <a:rPr lang="en-US" dirty="0" err="1"/>
+              <a:t>rc</a:t>
+            </a:r>
+            <a:endParaRPr lang="en-US" dirty="0"/>
           </a:p>
         </p:txBody>
       </p:sp>
@@ -4901,12 +4882,12 @@
           <a:p>
             <a:pPr algn="ctr"/>
             <a:r>
-              <a:rPr lang="en-US" sz="1600" dirty="0">
+              <a:rPr lang="en-US" sz="1600" dirty="0" err="1">
                 <a:solidFill>
                   <a:schemeClr val="bg1"/>
                 </a:solidFill>
               </a:rPr>
-              <a:t>u:RegisterCommand</a:t>
+              <a:t>rc:RegisterCommand</a:t>
             </a:r>
             <a:endParaRPr lang="en-SG" sz="1600" dirty="0">
               <a:solidFill>

</xml_diff>